<commit_message>
14 of 27 clear
</commit_message>
<xml_diff>
--- a/personal_guide/2과제 번역.pptx
+++ b/personal_guide/2과제 번역.pptx
@@ -232,7 +232,7 @@
               <a:pPr lvl="0">
                 <a:defRPr/>
               </a:pPr>
-              <a:t>2024-05-14</a:t>
+              <a:t>2024-05-15</a:t>
             </a:fld>
             <a:endParaRPr lang="ko-KR" altLang="en-US"/>
           </a:p>
@@ -503,10 +503,6 @@
             <a:pPr lvl="0">
               <a:defRPr/>
             </a:pPr>
-            <a:r>
-              <a:rPr lang="ko-KR" altLang="en-US"/>
-              <a:t/>
-            </a:r>
             <a:endParaRPr lang="ko-KR" altLang="en-US"/>
           </a:p>
         </p:txBody>
@@ -534,7 +530,7 @@
               <a:pPr lvl="0">
                 <a:defRPr/>
               </a:pPr>
-              <a:t>35</a:t>
+              <a:t>2</a:t>
             </a:fld>
             <a:endParaRPr lang="en-US" altLang="en-US"/>
           </a:p>
@@ -604,10 +600,6 @@
               <a:buNone/>
               <a:defRPr/>
             </a:pPr>
-            <a:r>
-              <a:rPr lang="ko-KR" altLang="en-US"/>
-              <a:t/>
-            </a:r>
             <a:endParaRPr lang="ko-KR" altLang="en-US"/>
           </a:p>
         </p:txBody>
@@ -715,10 +707,6 @@
               <a:buNone/>
               <a:defRPr/>
             </a:pPr>
-            <a:r>
-              <a:rPr lang="ko-KR" altLang="en-US"/>
-              <a:t/>
-            </a:r>
             <a:endParaRPr lang="ko-KR" altLang="en-US"/>
           </a:p>
         </p:txBody>
@@ -852,7 +840,7 @@
               <a:pPr lvl="0">
                 <a:defRPr/>
               </a:pPr>
-              <a:t>67</a:t>
+              <a:t>26</a:t>
             </a:fld>
             <a:endParaRPr lang="en-US" altLang="en-US"/>
           </a:p>
@@ -12458,295 +12446,6 @@
           <a:chExt cx="0" cy="0"/>
         </a:xfrm>
       </p:grpSpPr>
-      <p:sp>
-        <p:nvSpPr>
-          <p:cNvPr id="422" name="슬라이드 번호"/>
-          <p:cNvSpPr txBox="1">
-            <a:spLocks noGrp="1"/>
-          </p:cNvSpPr>
-          <p:nvPr>
-            <p:ph type="sldNum" sz="quarter" idx="2"/>
-          </p:nvPr>
-        </p:nvSpPr>
-        <p:spPr>
-          <a:xfrm>
-            <a:off x="11882566" y="9323948"/>
-            <a:ext cx="309436" cy="333249"/>
-          </a:xfrm>
-          <a:prstGeom prst="rect">
-            <a:avLst/>
-          </a:prstGeom>
-          <a:ln w="12700">
-            <a:miter/>
-          </a:ln>
-        </p:spPr>
-        <p:txBody>
-          <a:bodyPr wrap="none" lIns="65023" tIns="65023" rIns="65023" bIns="65023" anchor="ctr">
-            <a:spAutoFit/>
-          </a:bodyPr>
-          <a:lstStyle>
-            <a:defPPr marL="0" marR="0" indent="0" algn="l" defTabSz="914400" rtl="0" fontAlgn="auto" latinLnBrk="1" hangingPunct="0">
-              <a:lnSpc>
-                <a:spcPct val="100000"/>
-              </a:lnSpc>
-              <a:spcBef>
-                <a:spcPts val="0"/>
-              </a:spcBef>
-              <a:spcAft>
-                <a:spcPts val="0"/>
-              </a:spcAft>
-              <a:buClrTx/>
-              <a:buFontTx/>
-              <a:buNone/>
-              <a:defRPr kumimoji="0" sz="1800" b="0" i="0" u="none" strike="noStrike" cap="none" spc="0" normalizeH="0" baseline="0">
-                <a:solidFill>
-                  <a:srgbClr val="000000"/>
-                </a:solidFill>
-                <a:effectLst/>
-                <a:uFillTx/>
-              </a:defRPr>
-            </a:defPPr>
-            <a:lvl1pPr marL="0" marR="0" indent="0" algn="r" defTabSz="1300480" rtl="0" fontAlgn="auto" latinLnBrk="0" hangingPunct="0">
-              <a:lnSpc>
-                <a:spcPct val="100000"/>
-              </a:lnSpc>
-              <a:spcBef>
-                <a:spcPts val="0"/>
-              </a:spcBef>
-              <a:spcAft>
-                <a:spcPts val="0"/>
-              </a:spcAft>
-              <a:buClrTx/>
-              <a:buFontTx/>
-              <a:buNone/>
-              <a:defRPr kumimoji="0" sz="1400" b="0" i="0" u="none" strike="noStrike" cap="none" spc="0" normalizeH="0" baseline="0">
-                <a:solidFill>
-                  <a:srgbClr val="0f253f"/>
-                </a:solidFill>
-                <a:effectLst/>
-                <a:uFillTx/>
-                <a:latin typeface="+mj-lt"/>
-                <a:ea typeface="+mj-ea"/>
-                <a:cs typeface="+mj-cs"/>
-                <a:sym typeface="Garamond"/>
-              </a:defRPr>
-            </a:lvl1pPr>
-            <a:lvl2pPr marL="0" marR="0" indent="228600" algn="ctr" defTabSz="584200" rtl="0" fontAlgn="auto" latinLnBrk="0" hangingPunct="0">
-              <a:lnSpc>
-                <a:spcPct val="100000"/>
-              </a:lnSpc>
-              <a:spcBef>
-                <a:spcPts val="0"/>
-              </a:spcBef>
-              <a:spcAft>
-                <a:spcPts val="0"/>
-              </a:spcAft>
-              <a:buClrTx/>
-              <a:buFontTx/>
-              <a:buNone/>
-              <a:defRPr kumimoji="0" sz="2400" b="1" i="0" u="none" strike="noStrike" cap="none" spc="0" normalizeH="0" baseline="0">
-                <a:solidFill>
-                  <a:srgbClr val="000000"/>
-                </a:solidFill>
-                <a:effectLst/>
-                <a:uFillTx/>
-                <a:latin typeface="Helvetica Neue"/>
-                <a:ea typeface="Helvetica Neue"/>
-                <a:cs typeface="Helvetica Neue"/>
-                <a:sym typeface="Helvetica Neue"/>
-              </a:defRPr>
-            </a:lvl2pPr>
-            <a:lvl3pPr marL="0" marR="0" indent="457200" algn="ctr" defTabSz="584200" rtl="0" fontAlgn="auto" latinLnBrk="0" hangingPunct="0">
-              <a:lnSpc>
-                <a:spcPct val="100000"/>
-              </a:lnSpc>
-              <a:spcBef>
-                <a:spcPts val="0"/>
-              </a:spcBef>
-              <a:spcAft>
-                <a:spcPts val="0"/>
-              </a:spcAft>
-              <a:buClrTx/>
-              <a:buFontTx/>
-              <a:buNone/>
-              <a:defRPr kumimoji="0" sz="2400" b="1" i="0" u="none" strike="noStrike" cap="none" spc="0" normalizeH="0" baseline="0">
-                <a:solidFill>
-                  <a:srgbClr val="000000"/>
-                </a:solidFill>
-                <a:effectLst/>
-                <a:uFillTx/>
-                <a:latin typeface="Helvetica Neue"/>
-                <a:ea typeface="Helvetica Neue"/>
-                <a:cs typeface="Helvetica Neue"/>
-                <a:sym typeface="Helvetica Neue"/>
-              </a:defRPr>
-            </a:lvl3pPr>
-            <a:lvl4pPr marL="0" marR="0" indent="685800" algn="ctr" defTabSz="584200" rtl="0" fontAlgn="auto" latinLnBrk="0" hangingPunct="0">
-              <a:lnSpc>
-                <a:spcPct val="100000"/>
-              </a:lnSpc>
-              <a:spcBef>
-                <a:spcPts val="0"/>
-              </a:spcBef>
-              <a:spcAft>
-                <a:spcPts val="0"/>
-              </a:spcAft>
-              <a:buClrTx/>
-              <a:buFontTx/>
-              <a:buNone/>
-              <a:defRPr kumimoji="0" sz="2400" b="1" i="0" u="none" strike="noStrike" cap="none" spc="0" normalizeH="0" baseline="0">
-                <a:solidFill>
-                  <a:srgbClr val="000000"/>
-                </a:solidFill>
-                <a:effectLst/>
-                <a:uFillTx/>
-                <a:latin typeface="Helvetica Neue"/>
-                <a:ea typeface="Helvetica Neue"/>
-                <a:cs typeface="Helvetica Neue"/>
-                <a:sym typeface="Helvetica Neue"/>
-              </a:defRPr>
-            </a:lvl4pPr>
-            <a:lvl5pPr marL="0" marR="0" indent="914400" algn="ctr" defTabSz="584200" rtl="0" fontAlgn="auto" latinLnBrk="0" hangingPunct="0">
-              <a:lnSpc>
-                <a:spcPct val="100000"/>
-              </a:lnSpc>
-              <a:spcBef>
-                <a:spcPts val="0"/>
-              </a:spcBef>
-              <a:spcAft>
-                <a:spcPts val="0"/>
-              </a:spcAft>
-              <a:buClrTx/>
-              <a:buFontTx/>
-              <a:buNone/>
-              <a:defRPr kumimoji="0" sz="2400" b="1" i="0" u="none" strike="noStrike" cap="none" spc="0" normalizeH="0" baseline="0">
-                <a:solidFill>
-                  <a:srgbClr val="000000"/>
-                </a:solidFill>
-                <a:effectLst/>
-                <a:uFillTx/>
-                <a:latin typeface="Helvetica Neue"/>
-                <a:ea typeface="Helvetica Neue"/>
-                <a:cs typeface="Helvetica Neue"/>
-                <a:sym typeface="Helvetica Neue"/>
-              </a:defRPr>
-            </a:lvl5pPr>
-            <a:lvl6pPr marL="0" marR="0" indent="1143000" algn="ctr" defTabSz="584200" rtl="0" fontAlgn="auto" latinLnBrk="0" hangingPunct="0">
-              <a:lnSpc>
-                <a:spcPct val="100000"/>
-              </a:lnSpc>
-              <a:spcBef>
-                <a:spcPts val="0"/>
-              </a:spcBef>
-              <a:spcAft>
-                <a:spcPts val="0"/>
-              </a:spcAft>
-              <a:buClrTx/>
-              <a:buFontTx/>
-              <a:buNone/>
-              <a:defRPr kumimoji="0" sz="2400" b="1" i="0" u="none" strike="noStrike" cap="none" spc="0" normalizeH="0" baseline="0">
-                <a:solidFill>
-                  <a:srgbClr val="000000"/>
-                </a:solidFill>
-                <a:effectLst/>
-                <a:uFillTx/>
-                <a:latin typeface="Helvetica Neue"/>
-                <a:ea typeface="Helvetica Neue"/>
-                <a:cs typeface="Helvetica Neue"/>
-                <a:sym typeface="Helvetica Neue"/>
-              </a:defRPr>
-            </a:lvl6pPr>
-            <a:lvl7pPr marL="0" marR="0" indent="1371600" algn="ctr" defTabSz="584200" rtl="0" fontAlgn="auto" latinLnBrk="0" hangingPunct="0">
-              <a:lnSpc>
-                <a:spcPct val="100000"/>
-              </a:lnSpc>
-              <a:spcBef>
-                <a:spcPts val="0"/>
-              </a:spcBef>
-              <a:spcAft>
-                <a:spcPts val="0"/>
-              </a:spcAft>
-              <a:buClrTx/>
-              <a:buFontTx/>
-              <a:buNone/>
-              <a:defRPr kumimoji="0" sz="2400" b="1" i="0" u="none" strike="noStrike" cap="none" spc="0" normalizeH="0" baseline="0">
-                <a:solidFill>
-                  <a:srgbClr val="000000"/>
-                </a:solidFill>
-                <a:effectLst/>
-                <a:uFillTx/>
-                <a:latin typeface="Helvetica Neue"/>
-                <a:ea typeface="Helvetica Neue"/>
-                <a:cs typeface="Helvetica Neue"/>
-                <a:sym typeface="Helvetica Neue"/>
-              </a:defRPr>
-            </a:lvl7pPr>
-            <a:lvl8pPr marL="0" marR="0" indent="1600200" algn="ctr" defTabSz="584200" rtl="0" fontAlgn="auto" latinLnBrk="0" hangingPunct="0">
-              <a:lnSpc>
-                <a:spcPct val="100000"/>
-              </a:lnSpc>
-              <a:spcBef>
-                <a:spcPts val="0"/>
-              </a:spcBef>
-              <a:spcAft>
-                <a:spcPts val="0"/>
-              </a:spcAft>
-              <a:buClrTx/>
-              <a:buFontTx/>
-              <a:buNone/>
-              <a:defRPr kumimoji="0" sz="2400" b="1" i="0" u="none" strike="noStrike" cap="none" spc="0" normalizeH="0" baseline="0">
-                <a:solidFill>
-                  <a:srgbClr val="000000"/>
-                </a:solidFill>
-                <a:effectLst/>
-                <a:uFillTx/>
-                <a:latin typeface="Helvetica Neue"/>
-                <a:ea typeface="Helvetica Neue"/>
-                <a:cs typeface="Helvetica Neue"/>
-                <a:sym typeface="Helvetica Neue"/>
-              </a:defRPr>
-            </a:lvl8pPr>
-            <a:lvl9pPr marL="0" marR="0" indent="1828800" algn="ctr" defTabSz="584200" rtl="0" fontAlgn="auto" latinLnBrk="0" hangingPunct="0">
-              <a:lnSpc>
-                <a:spcPct val="100000"/>
-              </a:lnSpc>
-              <a:spcBef>
-                <a:spcPts val="0"/>
-              </a:spcBef>
-              <a:spcAft>
-                <a:spcPts val="0"/>
-              </a:spcAft>
-              <a:buClrTx/>
-              <a:buFontTx/>
-              <a:buNone/>
-              <a:defRPr kumimoji="0" sz="2400" b="1" i="0" u="none" strike="noStrike" cap="none" spc="0" normalizeH="0" baseline="0">
-                <a:solidFill>
-                  <a:srgbClr val="000000"/>
-                </a:solidFill>
-                <a:effectLst/>
-                <a:uFillTx/>
-                <a:latin typeface="Helvetica Neue"/>
-                <a:ea typeface="Helvetica Neue"/>
-                <a:cs typeface="Helvetica Neue"/>
-                <a:sym typeface="Helvetica Neue"/>
-              </a:defRPr>
-            </a:lvl9pPr>
-          </a:lstStyle>
-          <a:p>
-            <a:pPr lvl="0">
-              <a:defRPr/>
-            </a:pPr>
-            <a:fld id="{86CB4B4D-7CA3-9044-876B-883B54F8677D}" type="slidenum">
-              <a:rPr lang="en-US" altLang="ko-KR"/>
-              <a:pPr lvl="0">
-                <a:defRPr/>
-              </a:pPr>
-              <a:t>67</a:t>
-            </a:fld>
-            <a:endParaRPr lang="en-US" altLang="ko-KR"/>
-          </a:p>
-        </p:txBody>
-      </p:sp>
       <p:sp>
         <p:nvSpPr>
           <p:cNvPr id="423" name="In 1997, Pathfinder on Mars has stopped. OS has crashed due to the priority inversion."/>

</xml_diff>